<commit_message>
Add Concat, Zip, Merge
</commit_message>
<xml_diff>
--- a/ChainObservable/ObservableChain.pptx
+++ b/ChainObservable/ObservableChain.pptx
@@ -5,7 +5,7 @@
     <p:sldMasterId id="2147483657" r:id="rId1"/>
   </p:sldMasterIdLst>
   <p:notesMasterIdLst>
-    <p:notesMasterId r:id="rId14"/>
+    <p:notesMasterId r:id="rId17"/>
   </p:notesMasterIdLst>
   <p:sldIdLst>
     <p:sldId id="256" r:id="rId2"/>
@@ -20,6 +20,9 @@
     <p:sldId id="318" r:id="rId11"/>
     <p:sldId id="321" r:id="rId12"/>
     <p:sldId id="322" r:id="rId13"/>
+    <p:sldId id="323" r:id="rId14"/>
+    <p:sldId id="324" r:id="rId15"/>
+    <p:sldId id="325" r:id="rId16"/>
   </p:sldIdLst>
   <p:sldSz cx="9144000" cy="5143500" type="screen16x9"/>
   <p:notesSz cx="6858000" cy="9144000"/>
@@ -812,6 +815,309 @@
 </file>
 
 <file path=ppt/notesSlides/notesSlide12.xml><?xml version="1.0" encoding="utf-8"?>
+<p:notes xmlns:a="http://schemas.openxmlformats.org/drawingml/2006/main" xmlns:r="http://schemas.openxmlformats.org/officeDocument/2006/relationships" xmlns:p="http://schemas.openxmlformats.org/presentationml/2006/main" showMasterSp="0" showMasterPhAnim="0">
+  <p:cSld>
+    <p:spTree>
+      <p:nvGrpSpPr>
+        <p:cNvPr id="1" name="Shape 185"/>
+        <p:cNvGrpSpPr/>
+        <p:nvPr/>
+      </p:nvGrpSpPr>
+      <p:grpSpPr>
+        <a:xfrm>
+          <a:off x="0" y="0"/>
+          <a:ext cx="0" cy="0"/>
+          <a:chOff x="0" y="0"/>
+          <a:chExt cx="0" cy="0"/>
+        </a:xfrm>
+      </p:grpSpPr>
+      <p:sp>
+        <p:nvSpPr>
+          <p:cNvPr id="186" name="Shape 186"/>
+          <p:cNvSpPr>
+            <a:spLocks noGrp="1" noRot="1" noChangeAspect="1"/>
+          </p:cNvSpPr>
+          <p:nvPr>
+            <p:ph type="sldImg" idx="2"/>
+          </p:nvPr>
+        </p:nvSpPr>
+        <p:spPr>
+          <a:xfrm>
+            <a:off x="381000" y="685800"/>
+            <a:ext cx="6096000" cy="3429000"/>
+          </a:xfrm>
+          <a:custGeom>
+            <a:avLst/>
+            <a:gdLst/>
+            <a:ahLst/>
+            <a:cxnLst/>
+            <a:rect l="0" t="0" r="0" b="0"/>
+            <a:pathLst>
+              <a:path w="120000" h="120000" extrusionOk="0">
+                <a:moveTo>
+                  <a:pt x="0" y="0"/>
+                </a:moveTo>
+                <a:lnTo>
+                  <a:pt x="120000" y="0"/>
+                </a:lnTo>
+                <a:lnTo>
+                  <a:pt x="120000" y="120000"/>
+                </a:lnTo>
+                <a:lnTo>
+                  <a:pt x="0" y="120000"/>
+                </a:lnTo>
+                <a:close/>
+              </a:path>
+            </a:pathLst>
+          </a:custGeom>
+        </p:spPr>
+      </p:sp>
+      <p:sp>
+        <p:nvSpPr>
+          <p:cNvPr id="187" name="Shape 187"/>
+          <p:cNvSpPr txBox="1">
+            <a:spLocks noGrp="1"/>
+          </p:cNvSpPr>
+          <p:nvPr>
+            <p:ph type="body" idx="1"/>
+          </p:nvPr>
+        </p:nvSpPr>
+        <p:spPr>
+          <a:xfrm>
+            <a:off x="685800" y="4343400"/>
+            <a:ext cx="5486400" cy="4114800"/>
+          </a:xfrm>
+          <a:prstGeom prst="rect">
+            <a:avLst/>
+          </a:prstGeom>
+        </p:spPr>
+        <p:txBody>
+          <a:bodyPr wrap="square" lIns="91425" tIns="91425" rIns="91425" bIns="91425" anchor="t" anchorCtr="0">
+            <a:noAutofit/>
+          </a:bodyPr>
+          <a:lstStyle/>
+          <a:p>
+            <a:pPr lvl="0">
+              <a:spcBef>
+                <a:spcPts val="0"/>
+              </a:spcBef>
+              <a:buNone/>
+            </a:pPr>
+            <a:endParaRPr dirty="0"/>
+          </a:p>
+        </p:txBody>
+      </p:sp>
+    </p:spTree>
+  </p:cSld>
+  <p:clrMapOvr>
+    <a:masterClrMapping/>
+  </p:clrMapOvr>
+</p:notes>
+</file>
+
+<file path=ppt/notesSlides/notesSlide13.xml><?xml version="1.0" encoding="utf-8"?>
+<p:notes xmlns:a="http://schemas.openxmlformats.org/drawingml/2006/main" xmlns:r="http://schemas.openxmlformats.org/officeDocument/2006/relationships" xmlns:p="http://schemas.openxmlformats.org/presentationml/2006/main" showMasterSp="0" showMasterPhAnim="0">
+  <p:cSld>
+    <p:spTree>
+      <p:nvGrpSpPr>
+        <p:cNvPr id="1" name="Shape 185"/>
+        <p:cNvGrpSpPr/>
+        <p:nvPr/>
+      </p:nvGrpSpPr>
+      <p:grpSpPr>
+        <a:xfrm>
+          <a:off x="0" y="0"/>
+          <a:ext cx="0" cy="0"/>
+          <a:chOff x="0" y="0"/>
+          <a:chExt cx="0" cy="0"/>
+        </a:xfrm>
+      </p:grpSpPr>
+      <p:sp>
+        <p:nvSpPr>
+          <p:cNvPr id="186" name="Shape 186"/>
+          <p:cNvSpPr>
+            <a:spLocks noGrp="1" noRot="1" noChangeAspect="1"/>
+          </p:cNvSpPr>
+          <p:nvPr>
+            <p:ph type="sldImg" idx="2"/>
+          </p:nvPr>
+        </p:nvSpPr>
+        <p:spPr>
+          <a:xfrm>
+            <a:off x="381000" y="685800"/>
+            <a:ext cx="6096000" cy="3429000"/>
+          </a:xfrm>
+          <a:custGeom>
+            <a:avLst/>
+            <a:gdLst/>
+            <a:ahLst/>
+            <a:cxnLst/>
+            <a:rect l="0" t="0" r="0" b="0"/>
+            <a:pathLst>
+              <a:path w="120000" h="120000" extrusionOk="0">
+                <a:moveTo>
+                  <a:pt x="0" y="0"/>
+                </a:moveTo>
+                <a:lnTo>
+                  <a:pt x="120000" y="0"/>
+                </a:lnTo>
+                <a:lnTo>
+                  <a:pt x="120000" y="120000"/>
+                </a:lnTo>
+                <a:lnTo>
+                  <a:pt x="0" y="120000"/>
+                </a:lnTo>
+                <a:close/>
+              </a:path>
+            </a:pathLst>
+          </a:custGeom>
+        </p:spPr>
+      </p:sp>
+      <p:sp>
+        <p:nvSpPr>
+          <p:cNvPr id="187" name="Shape 187"/>
+          <p:cNvSpPr txBox="1">
+            <a:spLocks noGrp="1"/>
+          </p:cNvSpPr>
+          <p:nvPr>
+            <p:ph type="body" idx="1"/>
+          </p:nvPr>
+        </p:nvSpPr>
+        <p:spPr>
+          <a:xfrm>
+            <a:off x="685800" y="4343400"/>
+            <a:ext cx="5486400" cy="4114800"/>
+          </a:xfrm>
+          <a:prstGeom prst="rect">
+            <a:avLst/>
+          </a:prstGeom>
+        </p:spPr>
+        <p:txBody>
+          <a:bodyPr wrap="square" lIns="91425" tIns="91425" rIns="91425" bIns="91425" anchor="t" anchorCtr="0">
+            <a:noAutofit/>
+          </a:bodyPr>
+          <a:lstStyle/>
+          <a:p>
+            <a:pPr lvl="0">
+              <a:spcBef>
+                <a:spcPts val="0"/>
+              </a:spcBef>
+              <a:buNone/>
+            </a:pPr>
+            <a:endParaRPr dirty="0"/>
+          </a:p>
+        </p:txBody>
+      </p:sp>
+    </p:spTree>
+  </p:cSld>
+  <p:clrMapOvr>
+    <a:masterClrMapping/>
+  </p:clrMapOvr>
+</p:notes>
+</file>
+
+<file path=ppt/notesSlides/notesSlide14.xml><?xml version="1.0" encoding="utf-8"?>
+<p:notes xmlns:a="http://schemas.openxmlformats.org/drawingml/2006/main" xmlns:r="http://schemas.openxmlformats.org/officeDocument/2006/relationships" xmlns:p="http://schemas.openxmlformats.org/presentationml/2006/main" showMasterSp="0" showMasterPhAnim="0">
+  <p:cSld>
+    <p:spTree>
+      <p:nvGrpSpPr>
+        <p:cNvPr id="1" name="Shape 185"/>
+        <p:cNvGrpSpPr/>
+        <p:nvPr/>
+      </p:nvGrpSpPr>
+      <p:grpSpPr>
+        <a:xfrm>
+          <a:off x="0" y="0"/>
+          <a:ext cx="0" cy="0"/>
+          <a:chOff x="0" y="0"/>
+          <a:chExt cx="0" cy="0"/>
+        </a:xfrm>
+      </p:grpSpPr>
+      <p:sp>
+        <p:nvSpPr>
+          <p:cNvPr id="186" name="Shape 186"/>
+          <p:cNvSpPr>
+            <a:spLocks noGrp="1" noRot="1" noChangeAspect="1"/>
+          </p:cNvSpPr>
+          <p:nvPr>
+            <p:ph type="sldImg" idx="2"/>
+          </p:nvPr>
+        </p:nvSpPr>
+        <p:spPr>
+          <a:xfrm>
+            <a:off x="381000" y="685800"/>
+            <a:ext cx="6096000" cy="3429000"/>
+          </a:xfrm>
+          <a:custGeom>
+            <a:avLst/>
+            <a:gdLst/>
+            <a:ahLst/>
+            <a:cxnLst/>
+            <a:rect l="0" t="0" r="0" b="0"/>
+            <a:pathLst>
+              <a:path w="120000" h="120000" extrusionOk="0">
+                <a:moveTo>
+                  <a:pt x="0" y="0"/>
+                </a:moveTo>
+                <a:lnTo>
+                  <a:pt x="120000" y="0"/>
+                </a:lnTo>
+                <a:lnTo>
+                  <a:pt x="120000" y="120000"/>
+                </a:lnTo>
+                <a:lnTo>
+                  <a:pt x="0" y="120000"/>
+                </a:lnTo>
+                <a:close/>
+              </a:path>
+            </a:pathLst>
+          </a:custGeom>
+        </p:spPr>
+      </p:sp>
+      <p:sp>
+        <p:nvSpPr>
+          <p:cNvPr id="187" name="Shape 187"/>
+          <p:cNvSpPr txBox="1">
+            <a:spLocks noGrp="1"/>
+          </p:cNvSpPr>
+          <p:nvPr>
+            <p:ph type="body" idx="1"/>
+          </p:nvPr>
+        </p:nvSpPr>
+        <p:spPr>
+          <a:xfrm>
+            <a:off x="685800" y="4343400"/>
+            <a:ext cx="5486400" cy="4114800"/>
+          </a:xfrm>
+          <a:prstGeom prst="rect">
+            <a:avLst/>
+          </a:prstGeom>
+        </p:spPr>
+        <p:txBody>
+          <a:bodyPr wrap="square" lIns="91425" tIns="91425" rIns="91425" bIns="91425" anchor="t" anchorCtr="0">
+            <a:noAutofit/>
+          </a:bodyPr>
+          <a:lstStyle/>
+          <a:p>
+            <a:pPr lvl="0">
+              <a:spcBef>
+                <a:spcPts val="0"/>
+              </a:spcBef>
+              <a:buNone/>
+            </a:pPr>
+            <a:endParaRPr dirty="0"/>
+          </a:p>
+        </p:txBody>
+      </p:sp>
+    </p:spTree>
+  </p:cSld>
+  <p:clrMapOvr>
+    <a:masterClrMapping/>
+  </p:clrMapOvr>
+</p:notes>
+</file>
+
+<file path=ppt/notesSlides/notesSlide15.xml><?xml version="1.0" encoding="utf-8"?>
 <p:notes xmlns:a="http://schemas.openxmlformats.org/drawingml/2006/main" xmlns:r="http://schemas.openxmlformats.org/officeDocument/2006/relationships" xmlns:p="http://schemas.openxmlformats.org/presentationml/2006/main" showMasterSp="0" showMasterPhAnim="0">
   <p:cSld>
     <p:spTree>
@@ -6988,6 +7294,597 @@
     <p:extLst>
       <p:ext uri="{BB962C8B-B14F-4D97-AF65-F5344CB8AC3E}">
         <p14:creationId xmlns:p14="http://schemas.microsoft.com/office/powerpoint/2010/main" val="1527883548"/>
+      </p:ext>
+    </p:extLst>
+  </p:cSld>
+  <p:clrMapOvr>
+    <a:masterClrMapping/>
+  </p:clrMapOvr>
+  <p:timing>
+    <p:tnLst>
+      <p:par>
+        <p:cTn xmlns:p14="http://schemas.microsoft.com/office/powerpoint/2010/main" id="1" dur="indefinite" restart="never" nodeType="tmRoot"/>
+      </p:par>
+    </p:tnLst>
+  </p:timing>
+</p:sld>
+</file>
+
+<file path=ppt/slides/slide13.xml><?xml version="1.0" encoding="utf-8"?>
+<p:sld xmlns:a="http://schemas.openxmlformats.org/drawingml/2006/main" xmlns:r="http://schemas.openxmlformats.org/officeDocument/2006/relationships" xmlns:p="http://schemas.openxmlformats.org/presentationml/2006/main">
+  <p:cSld>
+    <p:spTree>
+      <p:nvGrpSpPr>
+        <p:cNvPr id="1" name="Shape 188"/>
+        <p:cNvGrpSpPr/>
+        <p:nvPr/>
+      </p:nvGrpSpPr>
+      <p:grpSpPr>
+        <a:xfrm>
+          <a:off x="0" y="0"/>
+          <a:ext cx="0" cy="0"/>
+          <a:chOff x="0" y="0"/>
+          <a:chExt cx="0" cy="0"/>
+        </a:xfrm>
+      </p:grpSpPr>
+      <p:sp>
+        <p:nvSpPr>
+          <p:cNvPr id="189" name="Shape 189"/>
+          <p:cNvSpPr txBox="1">
+            <a:spLocks noGrp="1"/>
+          </p:cNvSpPr>
+          <p:nvPr>
+            <p:ph type="title"/>
+          </p:nvPr>
+        </p:nvSpPr>
+        <p:spPr>
+          <a:xfrm>
+            <a:off x="238542" y="392575"/>
+            <a:ext cx="5258400" cy="766200"/>
+          </a:xfrm>
+          <a:prstGeom prst="rect">
+            <a:avLst/>
+          </a:prstGeom>
+        </p:spPr>
+        <p:txBody>
+          <a:bodyPr wrap="square" lIns="91425" tIns="91425" rIns="91425" bIns="91425" anchor="ctr" anchorCtr="0">
+            <a:noAutofit/>
+          </a:bodyPr>
+          <a:lstStyle/>
+          <a:p>
+            <a:pPr lvl="0"/>
+            <a:r>
+              <a:rPr lang="en-CA" dirty="0" smtClean="0"/>
+              <a:t>Zip</a:t>
+            </a:r>
+            <a:endParaRPr lang="en" dirty="0"/>
+          </a:p>
+        </p:txBody>
+      </p:sp>
+      <p:sp>
+        <p:nvSpPr>
+          <p:cNvPr id="192" name="Shape 192"/>
+          <p:cNvSpPr txBox="1">
+            <a:spLocks noGrp="1"/>
+          </p:cNvSpPr>
+          <p:nvPr>
+            <p:ph type="sldNum" idx="12"/>
+          </p:nvPr>
+        </p:nvSpPr>
+        <p:spPr>
+          <a:xfrm>
+            <a:off x="7618001" y="4636501"/>
+            <a:ext cx="1487401" cy="315600"/>
+          </a:xfrm>
+          <a:prstGeom prst="rect">
+            <a:avLst/>
+          </a:prstGeom>
+        </p:spPr>
+        <p:txBody>
+          <a:bodyPr wrap="square" lIns="91425" tIns="91425" rIns="91425" bIns="91425" anchor="ctr" anchorCtr="0">
+            <a:noAutofit/>
+          </a:bodyPr>
+          <a:lstStyle/>
+          <a:p>
+            <a:pPr lvl="0">
+              <a:spcBef>
+                <a:spcPts val="0"/>
+              </a:spcBef>
+              <a:buNone/>
+            </a:pPr>
+            <a:fld id="{00000000-1234-1234-1234-123412341234}" type="slidenum">
+              <a:rPr lang="en"/>
+              <a:t>13</a:t>
+            </a:fld>
+            <a:endParaRPr lang="en"/>
+          </a:p>
+        </p:txBody>
+      </p:sp>
+      <p:sp>
+        <p:nvSpPr>
+          <p:cNvPr id="7" name="Shape 237"/>
+          <p:cNvSpPr txBox="1">
+            <a:spLocks noGrp="1"/>
+          </p:cNvSpPr>
+          <p:nvPr>
+            <p:ph type="body" idx="1"/>
+          </p:nvPr>
+        </p:nvSpPr>
+        <p:spPr>
+          <a:xfrm>
+            <a:off x="238542" y="1477441"/>
+            <a:ext cx="8465191" cy="935559"/>
+          </a:xfrm>
+          <a:prstGeom prst="rect">
+            <a:avLst/>
+          </a:prstGeom>
+        </p:spPr>
+        <p:txBody>
+          <a:bodyPr wrap="square" lIns="91425" tIns="91425" rIns="91425" bIns="91425" anchor="ctr" anchorCtr="0">
+            <a:noAutofit/>
+          </a:bodyPr>
+          <a:lstStyle/>
+          <a:p>
+            <a:pPr>
+              <a:buNone/>
+            </a:pPr>
+            <a:r>
+              <a:rPr lang="en-US" sz="1200" b="1" dirty="0">
+                <a:latin typeface="Courier New"/>
+                <a:cs typeface="Courier New"/>
+              </a:rPr>
+              <a:t>Zip</a:t>
+            </a:r>
+          </a:p>
+          <a:p>
+            <a:pPr>
+              <a:buNone/>
+            </a:pPr>
+            <a:r>
+              <a:rPr lang="en-US" sz="1200" b="1" dirty="0">
+                <a:latin typeface="Courier New"/>
+                <a:cs typeface="Courier New"/>
+              </a:rPr>
+              <a:t>combine the emissions of multiple Observables together via a specified function and emit single items for each combination based on the results of this function</a:t>
+            </a:r>
+          </a:p>
+          <a:p>
+            <a:pPr>
+              <a:buNone/>
+            </a:pPr>
+            <a:endParaRPr lang="en-US" sz="1200" b="1" dirty="0">
+              <a:latin typeface="Courier New"/>
+              <a:cs typeface="Courier New"/>
+            </a:endParaRPr>
+          </a:p>
+        </p:txBody>
+      </p:sp>
+      <p:pic>
+        <p:nvPicPr>
+          <p:cNvPr id="3" name="Picture 2" descr="Screen Shot 2019-01-08 at 1.59.26 PM.png"/>
+          <p:cNvPicPr>
+            <a:picLocks noChangeAspect="1"/>
+          </p:cNvPicPr>
+          <p:nvPr/>
+        </p:nvPicPr>
+        <p:blipFill>
+          <a:blip r:embed="rId3">
+            <a:extLst>
+              <a:ext uri="{28A0092B-C50C-407E-A947-70E740481C1C}">
+                <a14:useLocalDpi xmlns:a14="http://schemas.microsoft.com/office/drawing/2010/main" val="0"/>
+              </a:ext>
+            </a:extLst>
+          </a:blip>
+          <a:stretch>
+            <a:fillRect/>
+          </a:stretch>
+        </p:blipFill>
+        <p:spPr>
+          <a:xfrm>
+            <a:off x="1363134" y="2413000"/>
+            <a:ext cx="3994562" cy="2476500"/>
+          </a:xfrm>
+          <a:prstGeom prst="rect">
+            <a:avLst/>
+          </a:prstGeom>
+        </p:spPr>
+      </p:pic>
+    </p:spTree>
+    <p:extLst>
+      <p:ext uri="{BB962C8B-B14F-4D97-AF65-F5344CB8AC3E}">
+        <p14:creationId xmlns:p14="http://schemas.microsoft.com/office/powerpoint/2010/main" val="284769177"/>
+      </p:ext>
+    </p:extLst>
+  </p:cSld>
+  <p:clrMapOvr>
+    <a:masterClrMapping/>
+  </p:clrMapOvr>
+  <p:timing>
+    <p:tnLst>
+      <p:par>
+        <p:cTn xmlns:p14="http://schemas.microsoft.com/office/powerpoint/2010/main" id="1" dur="indefinite" restart="never" nodeType="tmRoot"/>
+      </p:par>
+    </p:tnLst>
+  </p:timing>
+</p:sld>
+</file>
+
+<file path=ppt/slides/slide14.xml><?xml version="1.0" encoding="utf-8"?>
+<p:sld xmlns:a="http://schemas.openxmlformats.org/drawingml/2006/main" xmlns:r="http://schemas.openxmlformats.org/officeDocument/2006/relationships" xmlns:p="http://schemas.openxmlformats.org/presentationml/2006/main">
+  <p:cSld>
+    <p:spTree>
+      <p:nvGrpSpPr>
+        <p:cNvPr id="1" name="Shape 188"/>
+        <p:cNvGrpSpPr/>
+        <p:nvPr/>
+      </p:nvGrpSpPr>
+      <p:grpSpPr>
+        <a:xfrm>
+          <a:off x="0" y="0"/>
+          <a:ext cx="0" cy="0"/>
+          <a:chOff x="0" y="0"/>
+          <a:chExt cx="0" cy="0"/>
+        </a:xfrm>
+      </p:grpSpPr>
+      <p:sp>
+        <p:nvSpPr>
+          <p:cNvPr id="189" name="Shape 189"/>
+          <p:cNvSpPr txBox="1">
+            <a:spLocks noGrp="1"/>
+          </p:cNvSpPr>
+          <p:nvPr>
+            <p:ph type="title"/>
+          </p:nvPr>
+        </p:nvSpPr>
+        <p:spPr>
+          <a:xfrm>
+            <a:off x="238542" y="392575"/>
+            <a:ext cx="5258400" cy="766200"/>
+          </a:xfrm>
+          <a:prstGeom prst="rect">
+            <a:avLst/>
+          </a:prstGeom>
+        </p:spPr>
+        <p:txBody>
+          <a:bodyPr wrap="square" lIns="91425" tIns="91425" rIns="91425" bIns="91425" anchor="ctr" anchorCtr="0">
+            <a:noAutofit/>
+          </a:bodyPr>
+          <a:lstStyle/>
+          <a:p>
+            <a:pPr lvl="0"/>
+            <a:r>
+              <a:rPr lang="en-CA" dirty="0" err="1" smtClean="0"/>
+              <a:t>Concat</a:t>
+            </a:r>
+            <a:endParaRPr lang="en" dirty="0"/>
+          </a:p>
+        </p:txBody>
+      </p:sp>
+      <p:sp>
+        <p:nvSpPr>
+          <p:cNvPr id="192" name="Shape 192"/>
+          <p:cNvSpPr txBox="1">
+            <a:spLocks noGrp="1"/>
+          </p:cNvSpPr>
+          <p:nvPr>
+            <p:ph type="sldNum" idx="12"/>
+          </p:nvPr>
+        </p:nvSpPr>
+        <p:spPr>
+          <a:xfrm>
+            <a:off x="7618001" y="4636501"/>
+            <a:ext cx="1487401" cy="315600"/>
+          </a:xfrm>
+          <a:prstGeom prst="rect">
+            <a:avLst/>
+          </a:prstGeom>
+        </p:spPr>
+        <p:txBody>
+          <a:bodyPr wrap="square" lIns="91425" tIns="91425" rIns="91425" bIns="91425" anchor="ctr" anchorCtr="0">
+            <a:noAutofit/>
+          </a:bodyPr>
+          <a:lstStyle/>
+          <a:p>
+            <a:pPr lvl="0">
+              <a:spcBef>
+                <a:spcPts val="0"/>
+              </a:spcBef>
+              <a:buNone/>
+            </a:pPr>
+            <a:fld id="{00000000-1234-1234-1234-123412341234}" type="slidenum">
+              <a:rPr lang="en"/>
+              <a:t>14</a:t>
+            </a:fld>
+            <a:endParaRPr lang="en"/>
+          </a:p>
+        </p:txBody>
+      </p:sp>
+      <p:sp>
+        <p:nvSpPr>
+          <p:cNvPr id="7" name="Shape 237"/>
+          <p:cNvSpPr txBox="1">
+            <a:spLocks noGrp="1"/>
+          </p:cNvSpPr>
+          <p:nvPr>
+            <p:ph type="body" idx="1"/>
+          </p:nvPr>
+        </p:nvSpPr>
+        <p:spPr>
+          <a:xfrm>
+            <a:off x="238542" y="1477441"/>
+            <a:ext cx="8465191" cy="935559"/>
+          </a:xfrm>
+          <a:prstGeom prst="rect">
+            <a:avLst/>
+          </a:prstGeom>
+        </p:spPr>
+        <p:txBody>
+          <a:bodyPr wrap="square" lIns="91425" tIns="91425" rIns="91425" bIns="91425" anchor="ctr" anchorCtr="0">
+            <a:noAutofit/>
+          </a:bodyPr>
+          <a:lstStyle/>
+          <a:p>
+            <a:pPr>
+              <a:buNone/>
+            </a:pPr>
+            <a:r>
+              <a:rPr lang="en-US" sz="1200" b="1" dirty="0" err="1">
+                <a:latin typeface="Courier New"/>
+                <a:cs typeface="Courier New"/>
+              </a:rPr>
+              <a:t>Concat</a:t>
+            </a:r>
+            <a:endParaRPr lang="en-US" sz="1200" b="1" dirty="0">
+              <a:latin typeface="Courier New"/>
+              <a:cs typeface="Courier New"/>
+            </a:endParaRPr>
+          </a:p>
+          <a:p>
+            <a:pPr>
+              <a:buNone/>
+            </a:pPr>
+            <a:r>
+              <a:rPr lang="en-US" sz="1200" b="1" dirty="0">
+                <a:latin typeface="Courier New"/>
+                <a:cs typeface="Courier New"/>
+              </a:rPr>
+              <a:t>emit the emissions from two or more Observables without interleaving them</a:t>
+            </a:r>
+            <a:endParaRPr lang="en-US" sz="1200" b="1" dirty="0">
+              <a:latin typeface="Courier New"/>
+              <a:cs typeface="Courier New"/>
+            </a:endParaRPr>
+          </a:p>
+        </p:txBody>
+      </p:sp>
+      <p:pic>
+        <p:nvPicPr>
+          <p:cNvPr id="2" name="Picture 1" descr="Screen Shot 2019-01-08 at 2.14.53 PM.png"/>
+          <p:cNvPicPr>
+            <a:picLocks noChangeAspect="1"/>
+          </p:cNvPicPr>
+          <p:nvPr/>
+        </p:nvPicPr>
+        <p:blipFill>
+          <a:blip r:embed="rId3">
+            <a:extLst>
+              <a:ext uri="{28A0092B-C50C-407E-A947-70E740481C1C}">
+                <a14:useLocalDpi xmlns:a14="http://schemas.microsoft.com/office/drawing/2010/main" val="0"/>
+              </a:ext>
+            </a:extLst>
+          </a:blip>
+          <a:stretch>
+            <a:fillRect/>
+          </a:stretch>
+        </p:blipFill>
+        <p:spPr>
+          <a:xfrm>
+            <a:off x="1498600" y="2430170"/>
+            <a:ext cx="4326467" cy="2671002"/>
+          </a:xfrm>
+          <a:prstGeom prst="rect">
+            <a:avLst/>
+          </a:prstGeom>
+        </p:spPr>
+      </p:pic>
+    </p:spTree>
+    <p:extLst>
+      <p:ext uri="{BB962C8B-B14F-4D97-AF65-F5344CB8AC3E}">
+        <p14:creationId xmlns:p14="http://schemas.microsoft.com/office/powerpoint/2010/main" val="4167931597"/>
+      </p:ext>
+    </p:extLst>
+  </p:cSld>
+  <p:clrMapOvr>
+    <a:masterClrMapping/>
+  </p:clrMapOvr>
+  <p:timing>
+    <p:tnLst>
+      <p:par>
+        <p:cTn xmlns:p14="http://schemas.microsoft.com/office/powerpoint/2010/main" id="1" dur="indefinite" restart="never" nodeType="tmRoot"/>
+      </p:par>
+    </p:tnLst>
+  </p:timing>
+</p:sld>
+</file>
+
+<file path=ppt/slides/slide15.xml><?xml version="1.0" encoding="utf-8"?>
+<p:sld xmlns:a="http://schemas.openxmlformats.org/drawingml/2006/main" xmlns:r="http://schemas.openxmlformats.org/officeDocument/2006/relationships" xmlns:p="http://schemas.openxmlformats.org/presentationml/2006/main">
+  <p:cSld>
+    <p:spTree>
+      <p:nvGrpSpPr>
+        <p:cNvPr id="1" name="Shape 188"/>
+        <p:cNvGrpSpPr/>
+        <p:nvPr/>
+      </p:nvGrpSpPr>
+      <p:grpSpPr>
+        <a:xfrm>
+          <a:off x="0" y="0"/>
+          <a:ext cx="0" cy="0"/>
+          <a:chOff x="0" y="0"/>
+          <a:chExt cx="0" cy="0"/>
+        </a:xfrm>
+      </p:grpSpPr>
+      <p:sp>
+        <p:nvSpPr>
+          <p:cNvPr id="189" name="Shape 189"/>
+          <p:cNvSpPr txBox="1">
+            <a:spLocks noGrp="1"/>
+          </p:cNvSpPr>
+          <p:nvPr>
+            <p:ph type="title"/>
+          </p:nvPr>
+        </p:nvSpPr>
+        <p:spPr>
+          <a:xfrm>
+            <a:off x="238542" y="392575"/>
+            <a:ext cx="5258400" cy="766200"/>
+          </a:xfrm>
+          <a:prstGeom prst="rect">
+            <a:avLst/>
+          </a:prstGeom>
+        </p:spPr>
+        <p:txBody>
+          <a:bodyPr wrap="square" lIns="91425" tIns="91425" rIns="91425" bIns="91425" anchor="ctr" anchorCtr="0">
+            <a:noAutofit/>
+          </a:bodyPr>
+          <a:lstStyle/>
+          <a:p>
+            <a:pPr lvl="0"/>
+            <a:r>
+              <a:rPr lang="en-CA" dirty="0" smtClean="0"/>
+              <a:t>Merge</a:t>
+            </a:r>
+            <a:endParaRPr lang="en" dirty="0"/>
+          </a:p>
+        </p:txBody>
+      </p:sp>
+      <p:sp>
+        <p:nvSpPr>
+          <p:cNvPr id="192" name="Shape 192"/>
+          <p:cNvSpPr txBox="1">
+            <a:spLocks noGrp="1"/>
+          </p:cNvSpPr>
+          <p:nvPr>
+            <p:ph type="sldNum" idx="12"/>
+          </p:nvPr>
+        </p:nvSpPr>
+        <p:spPr>
+          <a:xfrm>
+            <a:off x="7618001" y="4636501"/>
+            <a:ext cx="1487401" cy="315600"/>
+          </a:xfrm>
+          <a:prstGeom prst="rect">
+            <a:avLst/>
+          </a:prstGeom>
+        </p:spPr>
+        <p:txBody>
+          <a:bodyPr wrap="square" lIns="91425" tIns="91425" rIns="91425" bIns="91425" anchor="ctr" anchorCtr="0">
+            <a:noAutofit/>
+          </a:bodyPr>
+          <a:lstStyle/>
+          <a:p>
+            <a:pPr lvl="0">
+              <a:spcBef>
+                <a:spcPts val="0"/>
+              </a:spcBef>
+              <a:buNone/>
+            </a:pPr>
+            <a:fld id="{00000000-1234-1234-1234-123412341234}" type="slidenum">
+              <a:rPr lang="en"/>
+              <a:t>15</a:t>
+            </a:fld>
+            <a:endParaRPr lang="en"/>
+          </a:p>
+        </p:txBody>
+      </p:sp>
+      <p:sp>
+        <p:nvSpPr>
+          <p:cNvPr id="7" name="Shape 237"/>
+          <p:cNvSpPr txBox="1">
+            <a:spLocks noGrp="1"/>
+          </p:cNvSpPr>
+          <p:nvPr>
+            <p:ph type="body" idx="1"/>
+          </p:nvPr>
+        </p:nvSpPr>
+        <p:spPr>
+          <a:xfrm>
+            <a:off x="238542" y="1477441"/>
+            <a:ext cx="8465191" cy="935559"/>
+          </a:xfrm>
+          <a:prstGeom prst="rect">
+            <a:avLst/>
+          </a:prstGeom>
+        </p:spPr>
+        <p:txBody>
+          <a:bodyPr wrap="square" lIns="91425" tIns="91425" rIns="91425" bIns="91425" anchor="ctr" anchorCtr="0">
+            <a:noAutofit/>
+          </a:bodyPr>
+          <a:lstStyle/>
+          <a:p>
+            <a:pPr>
+              <a:buNone/>
+            </a:pPr>
+            <a:r>
+              <a:rPr lang="en-US" sz="1200" b="1" dirty="0">
+                <a:latin typeface="Courier New"/>
+                <a:cs typeface="Courier New"/>
+              </a:rPr>
+              <a:t>Merge</a:t>
+            </a:r>
+          </a:p>
+          <a:p>
+            <a:pPr>
+              <a:buNone/>
+            </a:pPr>
+            <a:r>
+              <a:rPr lang="en-US" sz="1200" b="1" dirty="0">
+                <a:latin typeface="Courier New"/>
+                <a:cs typeface="Courier New"/>
+              </a:rPr>
+              <a:t>combine multiple Observables into one by merging their emissions</a:t>
+            </a:r>
+            <a:endParaRPr lang="en-US" sz="1200" b="1" dirty="0">
+              <a:latin typeface="Courier New"/>
+              <a:cs typeface="Courier New"/>
+            </a:endParaRPr>
+          </a:p>
+        </p:txBody>
+      </p:sp>
+      <p:pic>
+        <p:nvPicPr>
+          <p:cNvPr id="3" name="Picture 2" descr="Screen Shot 2019-01-08 at 2.16.31 PM.png"/>
+          <p:cNvPicPr>
+            <a:picLocks noChangeAspect="1"/>
+          </p:cNvPicPr>
+          <p:nvPr/>
+        </p:nvPicPr>
+        <p:blipFill>
+          <a:blip r:embed="rId3">
+            <a:extLst>
+              <a:ext uri="{28A0092B-C50C-407E-A947-70E740481C1C}">
+                <a14:useLocalDpi xmlns:a14="http://schemas.microsoft.com/office/drawing/2010/main" val="0"/>
+              </a:ext>
+            </a:extLst>
+          </a:blip>
+          <a:stretch>
+            <a:fillRect/>
+          </a:stretch>
+        </p:blipFill>
+        <p:spPr>
+          <a:xfrm>
+            <a:off x="1676400" y="2413000"/>
+            <a:ext cx="4438849" cy="2730500"/>
+          </a:xfrm>
+          <a:prstGeom prst="rect">
+            <a:avLst/>
+          </a:prstGeom>
+        </p:spPr>
+      </p:pic>
+    </p:spTree>
+    <p:extLst>
+      <p:ext uri="{BB962C8B-B14F-4D97-AF65-F5344CB8AC3E}">
+        <p14:creationId xmlns:p14="http://schemas.microsoft.com/office/powerpoint/2010/main" val="4171696883"/>
       </p:ext>
     </p:extLst>
   </p:cSld>

</xml_diff>